<commit_message>
Update AWS Rekognition Slide.pptx
</commit_message>
<xml_diff>
--- a/ppt/AWS Rekognition Slide.pptx
+++ b/ppt/AWS Rekognition Slide.pptx
@@ -34,10 +34,9 @@
     <p:sldId id="314" r:id="rId28"/>
     <p:sldId id="316" r:id="rId29"/>
     <p:sldId id="317" r:id="rId30"/>
-    <p:sldId id="318" r:id="rId31"/>
-    <p:sldId id="319" r:id="rId32"/>
-    <p:sldId id="321" r:id="rId33"/>
-    <p:sldId id="320" r:id="rId34"/>
+    <p:sldId id="319" r:id="rId31"/>
+    <p:sldId id="321" r:id="rId32"/>
+    <p:sldId id="320" r:id="rId33"/>
   </p:sldIdLst>
   <p:sldSz cx="9144000" cy="6858000" type="screen4x3"/>
   <p:notesSz cx="9144000" cy="6858000"/>
@@ -1572,6 +1571,10 @@
           </p:nvPr>
         </p:nvSpPr>
         <p:spPr>
+          <a:xfrm>
+            <a:off x="1920875" y="2507406"/>
+            <a:ext cx="5302250" cy="697230"/>
+          </a:xfrm>
           <a:prstGeom prst="rect">
             <a:avLst/>
           </a:prstGeom>
@@ -1582,7 +1585,7 @@
           </a:bodyPr>
           <a:lstStyle/>
           <a:p>
-            <a:pPr marL="13970">
+            <a:pPr marL="13970" algn="ctr">
               <a:lnSpc>
                 <a:spcPct val="100000"/>
               </a:lnSpc>
@@ -1595,78 +1598,10 @@
               <a:t>AWS </a:t>
             </a:r>
             <a:r>
-              <a:rPr spc="-235" dirty="0"/>
-              <a:t>Storage </a:t>
-            </a:r>
-            <a:r>
-              <a:rPr spc="-229" dirty="0"/>
-              <a:t>Services</a:t>
-            </a:r>
-            <a:r>
-              <a:rPr spc="-969" dirty="0"/>
-              <a:t> </a:t>
-            </a:r>
-            <a:r>
-              <a:rPr spc="-290" dirty="0"/>
-              <a:t>1:</a:t>
-            </a:r>
-          </a:p>
-        </p:txBody>
-      </p:sp>
-      <p:sp>
-        <p:nvSpPr>
-          <p:cNvPr id="4" name="object 4"/>
-          <p:cNvSpPr txBox="1"/>
-          <p:nvPr/>
-        </p:nvSpPr>
-        <p:spPr>
-          <a:xfrm>
-            <a:off x="3726941" y="2709798"/>
-            <a:ext cx="1693545" cy="635000"/>
-          </a:xfrm>
-          <a:prstGeom prst="rect">
-            <a:avLst/>
-          </a:prstGeom>
-        </p:spPr>
-        <p:txBody>
-          <a:bodyPr vert="horz" wrap="square" lIns="0" tIns="12065" rIns="0" bIns="0" rtlCol="0">
-            <a:spAutoFit/>
-          </a:bodyPr>
-          <a:lstStyle/>
-          <a:p>
-            <a:pPr marL="12700">
-              <a:lnSpc>
-                <a:spcPct val="100000"/>
-              </a:lnSpc>
-              <a:spcBef>
-                <a:spcPts val="95"/>
-              </a:spcBef>
-            </a:pPr>
-            <a:r>
-              <a:rPr sz="4000" spc="-254" dirty="0">
-                <a:latin typeface="Trebuchet MS"/>
-                <a:cs typeface="Trebuchet MS"/>
-              </a:rPr>
-              <a:t>EBS,</a:t>
-            </a:r>
-            <a:r>
-              <a:rPr sz="4000" spc="-445" dirty="0">
-                <a:latin typeface="Trebuchet MS"/>
-                <a:cs typeface="Trebuchet MS"/>
-              </a:rPr>
-              <a:t> </a:t>
-            </a:r>
-            <a:r>
-              <a:rPr sz="4000" spc="-225" dirty="0">
-                <a:latin typeface="Trebuchet MS"/>
-                <a:cs typeface="Trebuchet MS"/>
-              </a:rPr>
-              <a:t>EFS</a:t>
-            </a:r>
-            <a:endParaRPr sz="4000">
-              <a:latin typeface="Trebuchet MS"/>
-              <a:cs typeface="Trebuchet MS"/>
-            </a:endParaRPr>
+              <a:rPr lang="en-US" spc="-235" dirty="0" err="1"/>
+              <a:t>Rekognition</a:t>
+            </a:r>
+            <a:endParaRPr spc="-290" dirty="0"/>
           </a:p>
         </p:txBody>
       </p:sp>
@@ -12091,7 +12026,7 @@
                 <a:latin typeface="UKIJ CJK"/>
                 <a:cs typeface="UKIJ CJK"/>
               </a:rPr>
-              <a:t>를 눌러서 저장 및 편집기 나가기</a:t>
+              <a:t>를 눌러서 저장 후 편집기 종료</a:t>
             </a:r>
             <a:endParaRPr lang="en-US" altLang="ko-KR" sz="2000" dirty="0">
               <a:latin typeface="UKIJ CJK"/>
@@ -12103,7 +12038,7 @@
     </p:spTree>
     <p:extLst>
       <p:ext uri="{BB962C8B-B14F-4D97-AF65-F5344CB8AC3E}">
-        <p14:creationId xmlns:p14="http://schemas.microsoft.com/office/powerpoint/2010/main" val="2168902580"/>
+        <p14:creationId xmlns:p14="http://schemas.microsoft.com/office/powerpoint/2010/main" val="3875967245"/>
       </p:ext>
     </p:extLst>
   </p:cSld>
@@ -12209,309 +12144,6 @@
             <a:fld id="{81D60167-4931-47E6-BA6A-407CBD079E47}" type="slidenum">
               <a:rPr dirty="0"/>
               <a:t>31</a:t>
-            </a:fld>
-            <a:endParaRPr dirty="0"/>
-          </a:p>
-        </p:txBody>
-      </p:sp>
-      <p:sp>
-        <p:nvSpPr>
-          <p:cNvPr id="3" name="TextBox 2">
-            <a:extLst>
-              <a:ext uri="{FF2B5EF4-FFF2-40B4-BE49-F238E27FC236}">
-                <a16:creationId xmlns:a16="http://schemas.microsoft.com/office/drawing/2014/main" id="{FCA84D2F-CEA3-4229-A914-5FE613CEEF77}"/>
-              </a:ext>
-            </a:extLst>
-          </p:cNvPr>
-          <p:cNvSpPr txBox="1"/>
-          <p:nvPr/>
-        </p:nvSpPr>
-        <p:spPr>
-          <a:xfrm>
-            <a:off x="533400" y="1295400"/>
-            <a:ext cx="4536114" cy="2585323"/>
-          </a:xfrm>
-          <a:prstGeom prst="rect">
-            <a:avLst/>
-          </a:prstGeom>
-          <a:noFill/>
-        </p:spPr>
-        <p:txBody>
-          <a:bodyPr wrap="none" rtlCol="0">
-            <a:spAutoFit/>
-          </a:bodyPr>
-          <a:lstStyle/>
-          <a:p>
-            <a:r>
-              <a:rPr lang="en-US" altLang="ko-KR" dirty="0"/>
-              <a:t>def main():</a:t>
-            </a:r>
-          </a:p>
-          <a:p>
-            <a:r>
-              <a:rPr lang="en-US" altLang="ko-KR" dirty="0"/>
-              <a:t>    photo='test.jpg'</a:t>
-            </a:r>
-          </a:p>
-          <a:p>
-            <a:endParaRPr lang="en-US" altLang="ko-KR" dirty="0"/>
-          </a:p>
-          <a:p>
-            <a:r>
-              <a:rPr lang="en-US" altLang="ko-KR" dirty="0"/>
-              <a:t>    </a:t>
-            </a:r>
-            <a:r>
-              <a:rPr lang="en-US" altLang="ko-KR" dirty="0" err="1"/>
-              <a:t>label_count</a:t>
-            </a:r>
-            <a:r>
-              <a:rPr lang="en-US" altLang="ko-KR" dirty="0"/>
-              <a:t>=</a:t>
-            </a:r>
-            <a:r>
-              <a:rPr lang="en-US" altLang="ko-KR" dirty="0" err="1"/>
-              <a:t>detect_labels_local_file</a:t>
-            </a:r>
-            <a:r>
-              <a:rPr lang="en-US" altLang="ko-KR" dirty="0"/>
-              <a:t>(photo)</a:t>
-            </a:r>
-          </a:p>
-          <a:p>
-            <a:r>
-              <a:rPr lang="en-US" altLang="ko-KR" dirty="0"/>
-              <a:t>    print("Labels detected: " + str(</a:t>
-            </a:r>
-            <a:r>
-              <a:rPr lang="en-US" altLang="ko-KR" dirty="0" err="1"/>
-              <a:t>label_count</a:t>
-            </a:r>
-            <a:r>
-              <a:rPr lang="en-US" altLang="ko-KR" dirty="0"/>
-              <a:t>))</a:t>
-            </a:r>
-          </a:p>
-          <a:p>
-            <a:endParaRPr lang="en-US" altLang="ko-KR" dirty="0"/>
-          </a:p>
-          <a:p>
-            <a:endParaRPr lang="en-US" altLang="ko-KR" dirty="0"/>
-          </a:p>
-          <a:p>
-            <a:r>
-              <a:rPr lang="en-US" altLang="ko-KR" dirty="0"/>
-              <a:t>if __name__ == "__main__":</a:t>
-            </a:r>
-          </a:p>
-          <a:p>
-            <a:r>
-              <a:rPr lang="en-US" altLang="ko-KR" dirty="0"/>
-              <a:t>    main()</a:t>
-            </a:r>
-            <a:endParaRPr lang="ko-KR" altLang="en-US" dirty="0"/>
-          </a:p>
-        </p:txBody>
-      </p:sp>
-      <p:sp>
-        <p:nvSpPr>
-          <p:cNvPr id="5" name="object 3">
-            <a:extLst>
-              <a:ext uri="{FF2B5EF4-FFF2-40B4-BE49-F238E27FC236}">
-                <a16:creationId xmlns:a16="http://schemas.microsoft.com/office/drawing/2014/main" id="{A401EC2B-521F-48FB-9566-90DAFC8FBC8A}"/>
-              </a:ext>
-            </a:extLst>
-          </p:cNvPr>
-          <p:cNvSpPr txBox="1"/>
-          <p:nvPr/>
-        </p:nvSpPr>
-        <p:spPr>
-          <a:xfrm>
-            <a:off x="468085" y="4431755"/>
-            <a:ext cx="7837715" cy="321242"/>
-          </a:xfrm>
-          <a:prstGeom prst="rect">
-            <a:avLst/>
-          </a:prstGeom>
-        </p:spPr>
-        <p:txBody>
-          <a:bodyPr vert="horz" wrap="square" lIns="0" tIns="13335" rIns="0" bIns="0" rtlCol="0">
-            <a:spAutoFit/>
-          </a:bodyPr>
-          <a:lstStyle/>
-          <a:p>
-            <a:pPr marL="241300" indent="-228600">
-              <a:lnSpc>
-                <a:spcPct val="100000"/>
-              </a:lnSpc>
-              <a:spcBef>
-                <a:spcPts val="105"/>
-              </a:spcBef>
-              <a:buFont typeface="Arial"/>
-              <a:buChar char="•"/>
-              <a:tabLst>
-                <a:tab pos="240665" algn="l"/>
-                <a:tab pos="241300" algn="l"/>
-              </a:tabLst>
-            </a:pPr>
-            <a:r>
-              <a:rPr lang="ko-KR" altLang="en-US" sz="2000" dirty="0">
-                <a:latin typeface="UKIJ CJK"/>
-                <a:cs typeface="UKIJ CJK"/>
-              </a:rPr>
-              <a:t>다 입력했다면 </a:t>
-            </a:r>
-            <a:r>
-              <a:rPr lang="en-US" altLang="ko-KR" sz="2000" dirty="0">
-                <a:latin typeface="UKIJ CJK"/>
-                <a:cs typeface="UKIJ CJK"/>
-              </a:rPr>
-              <a:t>:</a:t>
-            </a:r>
-            <a:r>
-              <a:rPr lang="en-US" altLang="ko-KR" sz="2000" dirty="0" err="1">
-                <a:latin typeface="UKIJ CJK"/>
-                <a:cs typeface="UKIJ CJK"/>
-              </a:rPr>
-              <a:t>wq</a:t>
-            </a:r>
-            <a:r>
-              <a:rPr lang="ko-KR" altLang="en-US" sz="2000" dirty="0">
-                <a:latin typeface="UKIJ CJK"/>
-                <a:cs typeface="UKIJ CJK"/>
-              </a:rPr>
-              <a:t>를 입력하고 </a:t>
-            </a:r>
-            <a:r>
-              <a:rPr lang="en-US" altLang="ko-KR" sz="2000" dirty="0">
-                <a:latin typeface="UKIJ CJK"/>
-                <a:cs typeface="UKIJ CJK"/>
-              </a:rPr>
-              <a:t>enter</a:t>
-            </a:r>
-            <a:r>
-              <a:rPr lang="ko-KR" altLang="en-US" sz="2000" dirty="0">
-                <a:latin typeface="UKIJ CJK"/>
-                <a:cs typeface="UKIJ CJK"/>
-              </a:rPr>
-              <a:t>를 눌러서 저장 및 편집기 나가기</a:t>
-            </a:r>
-            <a:endParaRPr lang="en-US" altLang="ko-KR" sz="2000" dirty="0">
-              <a:latin typeface="UKIJ CJK"/>
-              <a:cs typeface="UKIJ CJK"/>
-            </a:endParaRPr>
-          </a:p>
-        </p:txBody>
-      </p:sp>
-    </p:spTree>
-    <p:extLst>
-      <p:ext uri="{BB962C8B-B14F-4D97-AF65-F5344CB8AC3E}">
-        <p14:creationId xmlns:p14="http://schemas.microsoft.com/office/powerpoint/2010/main" val="3875967245"/>
-      </p:ext>
-    </p:extLst>
-  </p:cSld>
-  <p:clrMapOvr>
-    <a:masterClrMapping/>
-  </p:clrMapOvr>
-</p:sld>
-</file>
-
-<file path=ppt/slides/slide32.xml><?xml version="1.0" encoding="utf-8"?>
-<p:sld xmlns:a="http://schemas.openxmlformats.org/drawingml/2006/main" xmlns:r="http://schemas.openxmlformats.org/officeDocument/2006/relationships" xmlns:p="http://schemas.openxmlformats.org/presentationml/2006/main">
-  <p:cSld>
-    <p:spTree>
-      <p:nvGrpSpPr>
-        <p:cNvPr id="1" name=""/>
-        <p:cNvGrpSpPr/>
-        <p:nvPr/>
-      </p:nvGrpSpPr>
-      <p:grpSpPr>
-        <a:xfrm>
-          <a:off x="0" y="0"/>
-          <a:ext cx="0" cy="0"/>
-          <a:chOff x="0" y="0"/>
-          <a:chExt cx="0" cy="0"/>
-        </a:xfrm>
-      </p:grpSpPr>
-      <p:sp>
-        <p:nvSpPr>
-          <p:cNvPr id="2" name="object 2"/>
-          <p:cNvSpPr txBox="1"/>
-          <p:nvPr/>
-        </p:nvSpPr>
-        <p:spPr>
-          <a:xfrm>
-            <a:off x="474370" y="177546"/>
-            <a:ext cx="8364830" cy="566822"/>
-          </a:xfrm>
-          <a:prstGeom prst="rect">
-            <a:avLst/>
-          </a:prstGeom>
-        </p:spPr>
-        <p:txBody>
-          <a:bodyPr vert="horz" wrap="square" lIns="0" tIns="12700" rIns="0" bIns="0" rtlCol="0">
-            <a:spAutoFit/>
-          </a:bodyPr>
-          <a:lstStyle/>
-          <a:p>
-            <a:pPr marL="12700">
-              <a:lnSpc>
-                <a:spcPct val="100000"/>
-              </a:lnSpc>
-              <a:spcBef>
-                <a:spcPts val="100"/>
-              </a:spcBef>
-            </a:pPr>
-            <a:r>
-              <a:rPr lang="en-US" sz="3600" b="1" spc="-185" dirty="0" err="1">
-                <a:latin typeface="Trebuchet MS"/>
-                <a:cs typeface="UnDinaru"/>
-              </a:rPr>
-              <a:t>Rekognition</a:t>
-            </a:r>
-            <a:r>
-              <a:rPr lang="ko-KR" altLang="en-US" sz="3600" b="1" spc="-185" dirty="0">
-                <a:latin typeface="Trebuchet MS"/>
-                <a:cs typeface="UnDinaru"/>
-              </a:rPr>
-              <a:t>을 이용한 사진 분석</a:t>
-            </a:r>
-            <a:endParaRPr sz="3600" b="1" dirty="0">
-              <a:latin typeface="UnDinaru"/>
-              <a:cs typeface="UnDinaru"/>
-            </a:endParaRPr>
-          </a:p>
-        </p:txBody>
-      </p:sp>
-      <p:sp>
-        <p:nvSpPr>
-          <p:cNvPr id="7" name="object 7"/>
-          <p:cNvSpPr txBox="1">
-            <a:spLocks noGrp="1"/>
-          </p:cNvSpPr>
-          <p:nvPr>
-            <p:ph type="sldNum" sz="quarter" idx="7"/>
-          </p:nvPr>
-        </p:nvSpPr>
-        <p:spPr>
-          <a:prstGeom prst="rect">
-            <a:avLst/>
-          </a:prstGeom>
-        </p:spPr>
-        <p:txBody>
-          <a:bodyPr vert="horz" wrap="square" lIns="0" tIns="0" rIns="0" bIns="0" rtlCol="0">
-            <a:spAutoFit/>
-          </a:bodyPr>
-          <a:lstStyle/>
-          <a:p>
-            <a:pPr marL="38100">
-              <a:lnSpc>
-                <a:spcPts val="1240"/>
-              </a:lnSpc>
-            </a:pPr>
-            <a:fld id="{81D60167-4931-47E6-BA6A-407CBD079E47}" type="slidenum">
-              <a:rPr dirty="0"/>
-              <a:t>32</a:t>
             </a:fld>
             <a:endParaRPr dirty="0"/>
           </a:p>
@@ -12613,7 +12245,7 @@
 </p:sld>
 </file>
 
-<file path=ppt/slides/slide33.xml><?xml version="1.0" encoding="utf-8"?>
+<file path=ppt/slides/slide32.xml><?xml version="1.0" encoding="utf-8"?>
 <p:sld xmlns:a="http://schemas.openxmlformats.org/drawingml/2006/main" xmlns:r="http://schemas.openxmlformats.org/officeDocument/2006/relationships" xmlns:p="http://schemas.openxmlformats.org/presentationml/2006/main">
   <p:cSld>
     <p:spTree>
@@ -12708,7 +12340,7 @@
             </a:pPr>
             <a:fld id="{81D60167-4931-47E6-BA6A-407CBD079E47}" type="slidenum">
               <a:rPr dirty="0"/>
-              <a:t>33</a:t>
+              <a:t>32</a:t>
             </a:fld>
             <a:endParaRPr dirty="0"/>
           </a:p>
@@ -13528,7 +13160,7 @@
                         </a:rPr>
                         <a:t>.</a:t>
                       </a:r>
-                      <a:endParaRPr sz="1600">
+                      <a:endParaRPr sz="1600" dirty="0">
                         <a:latin typeface="Carlito"/>
                         <a:cs typeface="Carlito"/>
                       </a:endParaRPr>
@@ -15083,7 +14715,7 @@
                           <a:spcPts val="30"/>
                         </a:spcBef>
                       </a:pPr>
-                      <a:endParaRPr sz="1750">
+                      <a:endParaRPr sz="1750" dirty="0">
                         <a:latin typeface="Times New Roman"/>
                         <a:cs typeface="Times New Roman"/>
                       </a:endParaRPr>
@@ -15126,7 +14758,7 @@
                         </a:rPr>
                         <a:t> Backup</a:t>
                       </a:r>
-                      <a:endParaRPr sz="1600">
+                      <a:endParaRPr sz="1600" dirty="0">
                         <a:latin typeface="Carlito"/>
                         <a:cs typeface="Carlito"/>
                       </a:endParaRPr>

</xml_diff>